<commit_message>
Klasa pionek, lasa plansza
Klasa pionek, lasa plansza, wyswietlanie planszy w konsoli
</commit_message>
<xml_diff>
--- a/PT - warcaby prezentacja 1.pptx
+++ b/PT - warcaby prezentacja 1.pptx
@@ -7218,7 +7218,14 @@
             </a:pPr>
             <a:r>
               <a:rPr lang="pl"/>
-              <a:t>Rozpoznawanie obrazu z gry w warcaby oraz wizualizacja stanu gry na komputerze</a:t>
+              <a:t>Rozpoznawanie obrazu z gry w warcaby</a:t>
+            </a:r>
+            <a:br>
+              <a:rPr lang="pl"/>
+            </a:br>
+            <a:r>
+              <a:rPr lang="pl"/>
+              <a:t>oraz wizualizacja stanu gry na komputerze</a:t>
             </a:r>
             <a:endParaRPr/>
           </a:p>
@@ -7587,7 +7594,7 @@
             </a:pPr>
             <a:r>
               <a:rPr lang="pl"/>
-              <a:t>Biblioteka ,,OpenCV''.</a:t>
+              <a:t>Biblioteka ,,EmguCV''.</a:t>
             </a:r>
             <a:endParaRPr/>
           </a:p>
@@ -7782,7 +7789,14 @@
             </a:pPr>
             <a:r>
               <a:rPr lang="pl"/>
-              <a:t>Podsystem do rozpoznawania obrazów wyszukuje pozycje pionków i przekazuje je do podsystemu wizualizacji.</a:t>
+              <a:t>Podsystem do rozpoznawania obrazów wyszukuje pozycje pionków</a:t>
+            </a:r>
+            <a:br>
+              <a:rPr lang="pl"/>
+            </a:br>
+            <a:r>
+              <a:rPr lang="pl"/>
+              <a:t>i przekazuje je do podsystemu wizualizacji.</a:t>
             </a:r>
             <a:endParaRPr/>
           </a:p>
@@ -8117,18 +8131,9 @@
               <a:rPr lang="pl"/>
               <a:t>17.05.2018</a:t>
             </a:r>
-            <a:endParaRPr/>
-          </a:p>
-          <a:p>
-            <a:pPr indent="0" lvl="0" marL="0">
-              <a:spcBef>
-                <a:spcPts val="1600"/>
-              </a:spcBef>
-              <a:spcAft>
-                <a:spcPts val="0"/>
-              </a:spcAft>
-              <a:buNone/>
-            </a:pPr>
+            <a:br>
+              <a:rPr lang="pl"/>
+            </a:br>
             <a:r>
               <a:rPr lang="pl"/>
               <a:t>Prace optymalizacyjne, testowanie aplikacji</a:t>

</xml_diff>